<commit_message>
added database, sample data, templates and main CRUD functionality
</commit_message>
<xml_diff>
--- a/documents/App page layout.pptx
+++ b/documents/App page layout.pptx
@@ -107,6 +107,11 @@
       </a:defRPr>
     </a:lvl9pPr>
   </p:defaultTextStyle>
+  <p:extLst>
+    <p:ext uri="{EFAFB233-063F-42B5-8137-9DF3F51BA10A}">
+      <p15:sldGuideLst xmlns:p15="http://schemas.microsoft.com/office/powerpoint/2012/main"/>
+    </p:ext>
+  </p:extLst>
 </p:presentation>
 </file>
 
@@ -7160,7 +7165,7 @@
           <p:nvPr>
             <p:extLst>
               <p:ext uri="{D42A27DB-BD31-4B8C-83A1-F6EECF244321}">
-                <p14:modId xmlns:p14="http://schemas.microsoft.com/office/powerpoint/2010/main" val="1604579682"/>
+                <p14:modId xmlns:p14="http://schemas.microsoft.com/office/powerpoint/2010/main" val="3710130389"/>
               </p:ext>
             </p:extLst>
           </p:nvPr>
@@ -7312,8 +7317,8 @@
                     <a:lstStyle/>
                     <a:p>
                       <a:r>
-                        <a:rPr lang="en-IE" sz="1500" dirty="0" err="1"/>
-                        <a:t>user_id</a:t>
+                        <a:rPr lang="en-IE" sz="1500" dirty="0"/>
+                        <a:t>Location</a:t>
                       </a:r>
                       <a:endParaRPr lang="en-GB" sz="1500" dirty="0"/>
                     </a:p>
@@ -7327,7 +7332,7 @@
                     <a:p>
                       <a:r>
                         <a:rPr lang="en-IE" sz="1500" dirty="0"/>
-                        <a:t>Integer, FK(user.id)</a:t>
+                        <a:t>String(250)</a:t>
                       </a:r>
                       <a:endParaRPr lang="en-GB" sz="1500" dirty="0"/>
                     </a:p>
@@ -7347,22 +7352,22 @@
                     <a:lstStyle/>
                     <a:p>
                       <a:r>
+                        <a:rPr lang="en-IE" sz="1500" dirty="0" err="1"/>
+                        <a:t>user_id</a:t>
+                      </a:r>
+                      <a:endParaRPr lang="en-GB" sz="1500" dirty="0"/>
+                    </a:p>
+                  </a:txBody>
+                  <a:tcPr marL="75693" marR="75693" marT="37846" marB="37846"/>
+                </a:tc>
+                <a:tc>
+                  <a:txBody>
+                    <a:bodyPr/>
+                    <a:lstStyle/>
+                    <a:p>
+                      <a:r>
                         <a:rPr lang="en-IE" sz="1500" dirty="0"/>
-                        <a:t>User</a:t>
-                      </a:r>
-                      <a:endParaRPr lang="en-GB" sz="1500" dirty="0"/>
-                    </a:p>
-                  </a:txBody>
-                  <a:tcPr marL="75693" marR="75693" marT="37846" marB="37846"/>
-                </a:tc>
-                <a:tc>
-                  <a:txBody>
-                    <a:bodyPr/>
-                    <a:lstStyle/>
-                    <a:p>
-                      <a:r>
-                        <a:rPr lang="en-IE" sz="1500" dirty="0"/>
-                        <a:t>Relationship(User)</a:t>
+                        <a:t>Integer, FK(user.id)</a:t>
                       </a:r>
                       <a:endParaRPr lang="en-GB" sz="1500" dirty="0"/>
                     </a:p>
@@ -7381,7 +7386,11 @@
                     <a:bodyPr/>
                     <a:lstStyle/>
                     <a:p>
-                      <a:endParaRPr lang="en-GB" sz="1500"/>
+                      <a:r>
+                        <a:rPr lang="en-IE" sz="1500" dirty="0"/>
+                        <a:t>User</a:t>
+                      </a:r>
+                      <a:endParaRPr lang="en-GB" sz="1500" dirty="0"/>
                     </a:p>
                   </a:txBody>
                   <a:tcPr marL="75693" marR="75693" marT="37846" marB="37846"/>
@@ -7391,7 +7400,11 @@
                     <a:bodyPr/>
                     <a:lstStyle/>
                     <a:p>
-                      <a:endParaRPr lang="en-GB" sz="1500"/>
+                      <a:r>
+                        <a:rPr lang="en-IE" sz="1500" dirty="0"/>
+                        <a:t>Relationship(User)</a:t>
+                      </a:r>
+                      <a:endParaRPr lang="en-GB" sz="1500" dirty="0"/>
                     </a:p>
                   </a:txBody>
                   <a:tcPr marL="75693" marR="75693" marT="37846" marB="37846"/>

</xml_diff>